<commit_message>
Adding current postgre files
</commit_message>
<xml_diff>
--- a/powerpoints/Roc_Day8.pptx
+++ b/powerpoints/Roc_Day8.pptx
@@ -25988,7 +25988,7 @@
             </a:r>
             <a:r>
               <a:rPr lang="en-US" dirty="0"/>
-              <a:t> – You can only read data that has been committed</a:t>
+              <a:t> – You can only read data that has been committed – prevents Dirty Read</a:t>
             </a:r>
           </a:p>
           <a:p>
@@ -26008,7 +26008,7 @@
             </a:r>
             <a:r>
               <a:rPr lang="en-US" dirty="0"/>
-              <a:t> – You do not allow transactions to occur simultaneously</a:t>
+              <a:t> – You do not allow transactions to occur simultaneously – prevents Phantom Read</a:t>
             </a:r>
           </a:p>
           <a:p>

</xml_diff>